<commit_message>
udpated with new values
</commit_message>
<xml_diff>
--- a/Practice_Instructions.pptx
+++ b/Practice_Instructions.pptx
@@ -109,6 +109,22 @@
       </a:defRPr>
     </a:lvl9pPr>
   </p:defaultTextStyle>
+  <p:extLst>
+    <p:ext uri="{EFAFB233-063F-42B5-8137-9DF3F51BA10A}">
+      <p15:sldGuideLst xmlns:p15="http://schemas.microsoft.com/office/powerpoint/2012/main">
+        <p15:guide id="1" orient="horz" pos="2160">
+          <p15:clr>
+            <a:srgbClr val="A4A3A4"/>
+          </p15:clr>
+        </p15:guide>
+        <p15:guide id="2" pos="2880">
+          <p15:clr>
+            <a:srgbClr val="A4A3A4"/>
+          </p15:clr>
+        </p15:guide>
+      </p15:sldGuideLst>
+    </p:ext>
+  </p:extLst>
 </p:presentation>
 </file>
 
@@ -293,7 +309,7 @@
           <a:p>
             <a:fld id="{3F074C8B-40DF-BA4F-AEE2-0CB06B153804}" type="datetimeFigureOut">
               <a:rPr lang="en-US" smtClean="0"/>
-              <a:t>5/11/15</a:t>
+              <a:t>10/18/17</a:t>
             </a:fld>
             <a:endParaRPr lang="en-US"/>
           </a:p>
@@ -463,7 +479,7 @@
           <a:p>
             <a:fld id="{3F074C8B-40DF-BA4F-AEE2-0CB06B153804}" type="datetimeFigureOut">
               <a:rPr lang="en-US" smtClean="0"/>
-              <a:t>5/11/15</a:t>
+              <a:t>10/18/17</a:t>
             </a:fld>
             <a:endParaRPr lang="en-US"/>
           </a:p>
@@ -643,7 +659,7 @@
           <a:p>
             <a:fld id="{3F074C8B-40DF-BA4F-AEE2-0CB06B153804}" type="datetimeFigureOut">
               <a:rPr lang="en-US" smtClean="0"/>
-              <a:t>5/11/15</a:t>
+              <a:t>10/18/17</a:t>
             </a:fld>
             <a:endParaRPr lang="en-US"/>
           </a:p>
@@ -813,7 +829,7 @@
           <a:p>
             <a:fld id="{3F074C8B-40DF-BA4F-AEE2-0CB06B153804}" type="datetimeFigureOut">
               <a:rPr lang="en-US" smtClean="0"/>
-              <a:t>5/11/15</a:t>
+              <a:t>10/18/17</a:t>
             </a:fld>
             <a:endParaRPr lang="en-US"/>
           </a:p>
@@ -1059,7 +1075,7 @@
           <a:p>
             <a:fld id="{3F074C8B-40DF-BA4F-AEE2-0CB06B153804}" type="datetimeFigureOut">
               <a:rPr lang="en-US" smtClean="0"/>
-              <a:t>5/11/15</a:t>
+              <a:t>10/18/17</a:t>
             </a:fld>
             <a:endParaRPr lang="en-US"/>
           </a:p>
@@ -1347,7 +1363,7 @@
           <a:p>
             <a:fld id="{3F074C8B-40DF-BA4F-AEE2-0CB06B153804}" type="datetimeFigureOut">
               <a:rPr lang="en-US" smtClean="0"/>
-              <a:t>5/11/15</a:t>
+              <a:t>10/18/17</a:t>
             </a:fld>
             <a:endParaRPr lang="en-US"/>
           </a:p>
@@ -1769,7 +1785,7 @@
           <a:p>
             <a:fld id="{3F074C8B-40DF-BA4F-AEE2-0CB06B153804}" type="datetimeFigureOut">
               <a:rPr lang="en-US" smtClean="0"/>
-              <a:t>5/11/15</a:t>
+              <a:t>10/18/17</a:t>
             </a:fld>
             <a:endParaRPr lang="en-US"/>
           </a:p>
@@ -1887,7 +1903,7 @@
           <a:p>
             <a:fld id="{3F074C8B-40DF-BA4F-AEE2-0CB06B153804}" type="datetimeFigureOut">
               <a:rPr lang="en-US" smtClean="0"/>
-              <a:t>5/11/15</a:t>
+              <a:t>10/18/17</a:t>
             </a:fld>
             <a:endParaRPr lang="en-US"/>
           </a:p>
@@ -1982,7 +1998,7 @@
           <a:p>
             <a:fld id="{3F074C8B-40DF-BA4F-AEE2-0CB06B153804}" type="datetimeFigureOut">
               <a:rPr lang="en-US" smtClean="0"/>
-              <a:t>5/11/15</a:t>
+              <a:t>10/18/17</a:t>
             </a:fld>
             <a:endParaRPr lang="en-US"/>
           </a:p>
@@ -2259,7 +2275,7 @@
           <a:p>
             <a:fld id="{3F074C8B-40DF-BA4F-AEE2-0CB06B153804}" type="datetimeFigureOut">
               <a:rPr lang="en-US" smtClean="0"/>
-              <a:t>5/11/15</a:t>
+              <a:t>10/18/17</a:t>
             </a:fld>
             <a:endParaRPr lang="en-US"/>
           </a:p>
@@ -2512,7 +2528,7 @@
           <a:p>
             <a:fld id="{3F074C8B-40DF-BA4F-AEE2-0CB06B153804}" type="datetimeFigureOut">
               <a:rPr lang="en-US" smtClean="0"/>
-              <a:t>5/11/15</a:t>
+              <a:t>10/18/17</a:t>
             </a:fld>
             <a:endParaRPr lang="en-US"/>
           </a:p>
@@ -2725,7 +2741,7 @@
           <a:p>
             <a:fld id="{3F074C8B-40DF-BA4F-AEE2-0CB06B153804}" type="datetimeFigureOut">
               <a:rPr lang="en-US" smtClean="0"/>
-              <a:t>5/11/15</a:t>
+              <a:t>10/18/17</a:t>
             </a:fld>
             <a:endParaRPr lang="en-US"/>
           </a:p>
@@ -3219,7 +3235,15 @@
             </a:pPr>
             <a:r>
               <a:rPr lang="en-US" dirty="0" smtClean="0"/>
-              <a:t>Imagine your true value is $2. Which amount should you bid?</a:t>
+              <a:t>Imagine your true value is </a:t>
+            </a:r>
+            <a:r>
+              <a:rPr lang="en-US" dirty="0" smtClean="0"/>
+              <a:t>$1.50. </a:t>
+            </a:r>
+            <a:r>
+              <a:rPr lang="en-US" dirty="0" smtClean="0"/>
+              <a:t>Which amount should you bid?</a:t>
             </a:r>
           </a:p>
           <a:p>
@@ -3237,8 +3261,13 @@
             </a:pPr>
             <a:r>
               <a:rPr lang="en-US" dirty="0" smtClean="0"/>
-              <a:t>			2) $2</a:t>
-            </a:r>
+              <a:t>			2) </a:t>
+            </a:r>
+            <a:r>
+              <a:rPr lang="en-US" dirty="0" smtClean="0"/>
+              <a:t>$1.50</a:t>
+            </a:r>
+            <a:endParaRPr lang="en-US" dirty="0" smtClean="0"/>
           </a:p>
           <a:p>
             <a:pPr>
@@ -3417,7 +3446,23 @@
             </a:pPr>
             <a:r>
               <a:rPr lang="en-US" dirty="0" smtClean="0"/>
-              <a:t>	1) When you bid $2 and a ball marked $1 is drawn from the urn</a:t>
+              <a:t>	1) When you bid </a:t>
+            </a:r>
+            <a:r>
+              <a:rPr lang="en-US" dirty="0" smtClean="0"/>
+              <a:t>$1.50 </a:t>
+            </a:r>
+            <a:r>
+              <a:rPr lang="en-US" dirty="0" smtClean="0"/>
+              <a:t>and a ball marked $</a:t>
+            </a:r>
+            <a:r>
+              <a:rPr lang="en-US" dirty="0" smtClean="0"/>
+              <a:t>1 </a:t>
+            </a:r>
+            <a:r>
+              <a:rPr lang="en-US" dirty="0" smtClean="0"/>
+              <a:t>is drawn from the urn</a:t>
             </a:r>
           </a:p>
           <a:p>
@@ -3427,6 +3472,34 @@
             <a:r>
               <a:rPr lang="en-US" dirty="0" smtClean="0"/>
               <a:t>	2) When you bid </a:t>
+            </a:r>
+            <a:r>
+              <a:rPr lang="en-US" dirty="0" smtClean="0">
+                <a:solidFill>
+                  <a:srgbClr val="000000"/>
+                </a:solidFill>
+              </a:rPr>
+              <a:t>$</a:t>
+            </a:r>
+            <a:r>
+              <a:rPr lang="en-US" dirty="0" smtClean="0">
+                <a:solidFill>
+                  <a:srgbClr val="000000"/>
+                </a:solidFill>
+              </a:rPr>
+              <a:t>1 </a:t>
+            </a:r>
+            <a:r>
+              <a:rPr lang="en-US" dirty="0" smtClean="0"/>
+              <a:t>and a ball marked</a:t>
+            </a:r>
+            <a:r>
+              <a:rPr lang="en-US" dirty="0" smtClean="0">
+                <a:solidFill>
+                  <a:srgbClr val="FF0000"/>
+                </a:solidFill>
+              </a:rPr>
+              <a:t> </a:t>
             </a:r>
             <a:r>
               <a:rPr lang="en-US" dirty="0" smtClean="0">
@@ -3435,26 +3508,6 @@
                 </a:solidFill>
               </a:rPr>
               <a:t>$1.50 </a:t>
-            </a:r>
-            <a:r>
-              <a:rPr lang="en-US" dirty="0" smtClean="0"/>
-              <a:t>and a ball marked</a:t>
-            </a:r>
-            <a:r>
-              <a:rPr lang="en-US" dirty="0" smtClean="0">
-                <a:solidFill>
-                  <a:srgbClr val="FF0000"/>
-                </a:solidFill>
-              </a:rPr>
-              <a:t> </a:t>
-            </a:r>
-            <a:r>
-              <a:rPr lang="en-US" dirty="0" smtClean="0">
-                <a:solidFill>
-                  <a:srgbClr val="000000"/>
-                </a:solidFill>
-              </a:rPr>
-              <a:t>$2 </a:t>
             </a:r>
             <a:r>
               <a:rPr lang="en-US" dirty="0" smtClean="0"/>
@@ -3636,7 +3689,15 @@
             </a:pPr>
             <a:r>
               <a:rPr lang="en-US" dirty="0" smtClean="0"/>
-              <a:t>Remember, you should respond using the number keys from 1-5 to indicate how much you would be willing to pay:	</a:t>
+              <a:t>Remember, you should respond using the number keys from </a:t>
+            </a:r>
+            <a:r>
+              <a:rPr lang="en-US" dirty="0" smtClean="0"/>
+              <a:t>1-4 </a:t>
+            </a:r>
+            <a:r>
+              <a:rPr lang="en-US" dirty="0" smtClean="0"/>
+              <a:t>to indicate how much you would be willing to pay:	</a:t>
             </a:r>
           </a:p>
           <a:p>
@@ -3682,7 +3743,7 @@
         </p:nvSpPr>
         <p:spPr>
           <a:xfrm>
-            <a:off x="2230427" y="3916851"/>
+            <a:off x="2742056" y="3916851"/>
             <a:ext cx="609600" cy="608012"/>
           </a:xfrm>
           <a:prstGeom prst="rect">
@@ -3740,7 +3801,7 @@
         </p:nvSpPr>
         <p:spPr>
           <a:xfrm>
-            <a:off x="3245411" y="3916851"/>
+            <a:off x="3757040" y="3916851"/>
             <a:ext cx="609600" cy="608012"/>
           </a:xfrm>
           <a:prstGeom prst="rect">
@@ -3798,7 +3859,7 @@
         </p:nvSpPr>
         <p:spPr>
           <a:xfrm>
-            <a:off x="4260395" y="3915263"/>
+            <a:off x="4772024" y="3915263"/>
             <a:ext cx="609600" cy="608012"/>
           </a:xfrm>
           <a:prstGeom prst="rect">
@@ -3856,7 +3917,7 @@
         </p:nvSpPr>
         <p:spPr>
           <a:xfrm>
-            <a:off x="5183939" y="3915263"/>
+            <a:off x="5695568" y="3915263"/>
             <a:ext cx="609600" cy="608012"/>
           </a:xfrm>
           <a:prstGeom prst="rect">
@@ -3908,64 +3969,6 @@
       </p:sp>
       <p:sp>
         <p:nvSpPr>
-          <p:cNvPr id="15" name="Rectangle 14"/>
-          <p:cNvSpPr/>
-          <p:nvPr/>
-        </p:nvSpPr>
-        <p:spPr>
-          <a:xfrm>
-            <a:off x="6153203" y="3915263"/>
-            <a:ext cx="609600" cy="608012"/>
-          </a:xfrm>
-          <a:prstGeom prst="rect">
-            <a:avLst/>
-          </a:prstGeom>
-          <a:solidFill>
-            <a:schemeClr val="bg1">
-              <a:lumMod val="75000"/>
-            </a:schemeClr>
-          </a:solidFill>
-          <a:ln>
-            <a:solidFill>
-              <a:schemeClr val="tx1">
-                <a:lumMod val="65000"/>
-                <a:lumOff val="35000"/>
-              </a:schemeClr>
-            </a:solidFill>
-          </a:ln>
-          <a:scene3d>
-            <a:camera prst="orthographicFront"/>
-            <a:lightRig rig="threePt" dir="t"/>
-          </a:scene3d>
-          <a:sp3d>
-            <a:bevelT prst="angle"/>
-          </a:sp3d>
-        </p:spPr>
-        <p:style>
-          <a:lnRef idx="1">
-            <a:schemeClr val="accent1"/>
-          </a:lnRef>
-          <a:fillRef idx="3">
-            <a:schemeClr val="accent1"/>
-          </a:fillRef>
-          <a:effectRef idx="2">
-            <a:schemeClr val="accent1"/>
-          </a:effectRef>
-          <a:fontRef idx="minor">
-            <a:schemeClr val="lt1"/>
-          </a:fontRef>
-        </p:style>
-        <p:txBody>
-          <a:bodyPr rtlCol="0" anchor="ctr"/>
-          <a:lstStyle/>
-          <a:p>
-            <a:pPr algn="ctr"/>
-            <a:endParaRPr lang="en-US"/>
-          </a:p>
-        </p:txBody>
-      </p:sp>
-      <p:sp>
-        <p:nvSpPr>
           <p:cNvPr id="18" name="Content Placeholder 2"/>
           <p:cNvSpPr txBox="1">
             <a:spLocks/>
@@ -3974,8 +3977,8 @@
         </p:nvSpPr>
         <p:spPr>
           <a:xfrm>
-            <a:off x="2001827" y="3360527"/>
-            <a:ext cx="4953000" cy="1143000"/>
+            <a:off x="2513456" y="3360527"/>
+            <a:ext cx="4126830" cy="1143000"/>
           </a:xfrm>
           <a:prstGeom prst="rect">
             <a:avLst/>
@@ -4019,8 +4022,39 @@
                 <a:ea typeface="+mn-ea"/>
                 <a:cs typeface="+mn-cs"/>
               </a:rPr>
-              <a:t>   $0       $.50      $1    $1.50     $2        </a:t>
-            </a:r>
+              <a:t>   $0       $.50      $1    $</a:t>
+            </a:r>
+            <a:r>
+              <a:rPr kumimoji="0" lang="en-US" sz="2800" b="0" i="0" u="none" strike="noStrike" kern="1200" cap="none" spc="0" normalizeH="0" baseline="0" noProof="0" dirty="0" smtClean="0">
+                <a:ln>
+                  <a:noFill/>
+                </a:ln>
+                <a:solidFill>
+                  <a:schemeClr val="tx1"/>
+                </a:solidFill>
+                <a:effectLst/>
+                <a:uLnTx/>
+                <a:uFillTx/>
+                <a:latin typeface="+mn-lt"/>
+                <a:ea typeface="+mn-ea"/>
+                <a:cs typeface="+mn-cs"/>
+              </a:rPr>
+              <a:t>1.50     </a:t>
+            </a:r>
+            <a:endParaRPr kumimoji="0" lang="en-US" sz="2800" b="0" i="0" u="none" strike="noStrike" kern="1200" cap="none" spc="0" normalizeH="0" baseline="0" noProof="0" dirty="0" smtClean="0">
+              <a:ln>
+                <a:noFill/>
+              </a:ln>
+              <a:solidFill>
+                <a:schemeClr val="tx1"/>
+              </a:solidFill>
+              <a:effectLst/>
+              <a:uLnTx/>
+              <a:uFillTx/>
+              <a:latin typeface="+mn-lt"/>
+              <a:ea typeface="+mn-ea"/>
+              <a:cs typeface="+mn-cs"/>
+            </a:endParaRPr>
           </a:p>
           <a:p>
             <a:pPr marL="342794" marR="0" lvl="0" indent="-342794" algn="l" defTabSz="457056" rtl="0" eaLnBrk="1" fontAlgn="auto" latinLnBrk="0" hangingPunct="1">
@@ -4055,11 +4089,7 @@
                 <a:ea typeface="+mn-ea"/>
                 <a:cs typeface="+mn-cs"/>
               </a:rPr>
-              <a:t>    1         2         3        4         </a:t>
-            </a:r>
-            <a:r>
-              <a:rPr lang="en-US" sz="3100" dirty="0"/>
-              <a:t>5</a:t>
+              <a:t>    1         2         3        4  </a:t>
             </a:r>
             <a:endParaRPr kumimoji="0" lang="en-US" sz="3100" b="0" i="0" u="none" strike="noStrike" kern="1200" cap="none" spc="0" normalizeH="0" baseline="0" noProof="0" dirty="0">
               <a:ln>
@@ -4091,7 +4121,7 @@
   <p:timing>
     <p:tnLst>
       <p:par>
-        <p:cTn xmlns:p14="http://schemas.microsoft.com/office/powerpoint/2010/main" id="1" dur="indefinite" restart="never" nodeType="tmRoot"/>
+        <p:cTn id="1" dur="indefinite" restart="never" nodeType="tmRoot"/>
       </p:par>
     </p:tnLst>
   </p:timing>

</xml_diff>